<commit_message>
LaTeX figure references fixed.
</commit_message>
<xml_diff>
--- a/report/poster/OldPoster.pptx
+++ b/report/poster/OldPoster.pptx
@@ -324,11 +324,11 @@
           <c:showBubbleSize val="0"/>
         </c:dLbls>
         <c:gapWidth val="150"/>
-        <c:axId val="-2142738480"/>
-        <c:axId val="-2142735568"/>
+        <c:axId val="2106886560"/>
+        <c:axId val="2106883616"/>
       </c:barChart>
       <c:catAx>
-        <c:axId val="-2142738480"/>
+        <c:axId val="2106886560"/>
         <c:scaling>
           <c:orientation val="minMax"/>
         </c:scaling>
@@ -337,7 +337,7 @@
         <c:majorTickMark val="out"/>
         <c:minorTickMark val="none"/>
         <c:tickLblPos val="nextTo"/>
-        <c:crossAx val="-2142735568"/>
+        <c:crossAx val="2106883616"/>
         <c:crosses val="autoZero"/>
         <c:auto val="1"/>
         <c:lblAlgn val="ctr"/>
@@ -345,7 +345,7 @@
         <c:noMultiLvlLbl val="0"/>
       </c:catAx>
       <c:valAx>
-        <c:axId val="-2142735568"/>
+        <c:axId val="2106883616"/>
         <c:scaling>
           <c:orientation val="minMax"/>
         </c:scaling>
@@ -356,7 +356,7 @@
         <c:majorTickMark val="out"/>
         <c:minorTickMark val="none"/>
         <c:tickLblPos val="nextTo"/>
-        <c:crossAx val="-2142738480"/>
+        <c:crossAx val="2106886560"/>
         <c:crosses val="autoZero"/>
         <c:crossBetween val="between"/>
       </c:valAx>
@@ -2024,7 +2024,7 @@
           <a:p>
             <a:fld id="{985D6BDF-9D0E-4E2B-85B8-D8F4790360C9}" type="datetimeFigureOut">
               <a:rPr lang="en-US" smtClean="0"/>
-              <a:t>12/12/17</a:t>
+              <a:t>12/23/17</a:t>
             </a:fld>
             <a:endParaRPr lang="en-US" dirty="0"/>
           </a:p>
@@ -2244,7 +2244,7 @@
           <a:p>
             <a:fld id="{985D6BDF-9D0E-4E2B-85B8-D8F4790360C9}" type="datetimeFigureOut">
               <a:rPr lang="en-US" smtClean="0"/>
-              <a:t>12/12/17</a:t>
+              <a:t>12/23/17</a:t>
             </a:fld>
             <a:endParaRPr lang="en-US" dirty="0"/>
           </a:p>
@@ -2640,14 +2640,14 @@
           <a:effectLst/>
           <a:extLst>
             <a:ext uri="{909E8E84-426E-40dd-AFC4-6F175D3DCCD1}">
-              <a14:hiddenFill xmlns:a14="http://schemas.microsoft.com/office/drawing/2010/main" xmlns="">
+              <a14:hiddenFill xmlns="" xmlns:a14="http://schemas.microsoft.com/office/drawing/2010/main">
                 <a:solidFill>
                   <a:schemeClr val="accent1"/>
                 </a:solidFill>
               </a14:hiddenFill>
             </a:ext>
             <a:ext uri="{91240B29-F687-4f45-9708-019B960494DF}">
-              <a14:hiddenLine xmlns:a14="http://schemas.microsoft.com/office/drawing/2010/main" xmlns="" w="9525">
+              <a14:hiddenLine xmlns="" xmlns:a14="http://schemas.microsoft.com/office/drawing/2010/main" w="9525">
                 <a:solidFill>
                   <a:schemeClr val="tx1"/>
                 </a:solidFill>
@@ -2657,7 +2657,7 @@
               </a14:hiddenLine>
             </a:ext>
             <a:ext uri="{AF507438-7753-43e0-B8FC-AC1667EBCBE1}">
-              <a14:hiddenEffects xmlns:a14="http://schemas.microsoft.com/office/drawing/2010/main" xmlns="">
+              <a14:hiddenEffects xmlns="" xmlns:a14="http://schemas.microsoft.com/office/drawing/2010/main">
                 <a:effectLst>
                   <a:outerShdw dist="35921" dir="2700000" algn="ctr" rotWithShape="0">
                     <a:schemeClr val="bg2"/>
@@ -2823,14 +2823,14 @@
           <a:effectLst/>
           <a:extLst>
             <a:ext uri="{909E8E84-426E-40dd-AFC4-6F175D3DCCD1}">
-              <a14:hiddenFill xmlns:a14="http://schemas.microsoft.com/office/drawing/2010/main" xmlns="">
+              <a14:hiddenFill xmlns="" xmlns:a14="http://schemas.microsoft.com/office/drawing/2010/main">
                 <a:solidFill>
                   <a:schemeClr val="accent1"/>
                 </a:solidFill>
               </a14:hiddenFill>
             </a:ext>
             <a:ext uri="{91240B29-F687-4f45-9708-019B960494DF}">
-              <a14:hiddenLine xmlns:a14="http://schemas.microsoft.com/office/drawing/2010/main" xmlns="" w="9525">
+              <a14:hiddenLine xmlns="" xmlns:a14="http://schemas.microsoft.com/office/drawing/2010/main" w="9525">
                 <a:solidFill>
                   <a:schemeClr val="tx1"/>
                 </a:solidFill>
@@ -2840,7 +2840,7 @@
               </a14:hiddenLine>
             </a:ext>
             <a:ext uri="{AF507438-7753-43e0-B8FC-AC1667EBCBE1}">
-              <a14:hiddenEffects xmlns:a14="http://schemas.microsoft.com/office/drawing/2010/main" xmlns="">
+              <a14:hiddenEffects xmlns="" xmlns:a14="http://schemas.microsoft.com/office/drawing/2010/main">
                 <a:effectLst>
                   <a:outerShdw dist="35921" dir="2700000" algn="ctr" rotWithShape="0">
                     <a:schemeClr val="bg2"/>
@@ -3028,20 +3028,7 @@
                 <a:latin typeface="Times New Roman"/>
                 <a:cs typeface="Times New Roman"/>
               </a:rPr>
-              <a:t> Patel; Shantanu Bobhate; Vincent </a:t>
-            </a:r>
-            <a:r>
-              <a:rPr lang="en-US" sz="4000" dirty="0" smtClean="0">
-                <a:solidFill>
-                  <a:schemeClr val="accent3">
-                    <a:lumMod val="20000"/>
-                    <a:lumOff val="80000"/>
-                  </a:schemeClr>
-                </a:solidFill>
-                <a:latin typeface="Times New Roman"/>
-                <a:cs typeface="Times New Roman"/>
-              </a:rPr>
-              <a:t>Wahl</a:t>
+              <a:t> Patel; Shantanu Bobhate; Vincent Wahl</a:t>
             </a:r>
           </a:p>
           <a:p>
@@ -3178,20 +3165,7 @@
                 <a:latin typeface="Times New Roman"/>
                 <a:cs typeface="Times New Roman"/>
               </a:rPr>
-              <a:t>Boston </a:t>
-            </a:r>
-            <a:r>
-              <a:rPr lang="en-US" sz="4000" dirty="0" smtClean="0">
-                <a:solidFill>
-                  <a:schemeClr val="accent3">
-                    <a:lumMod val="20000"/>
-                    <a:lumOff val="80000"/>
-                  </a:schemeClr>
-                </a:solidFill>
-                <a:latin typeface="Times New Roman"/>
-                <a:cs typeface="Times New Roman"/>
-              </a:rPr>
-              <a:t>University CS 542 Fall 2017</a:t>
+              <a:t>Boston University CS 542 Fall 2017</a:t>
             </a:r>
             <a:endParaRPr lang="en-US" sz="4000" dirty="0">
               <a:solidFill>
@@ -3601,9 +3575,6 @@
               </a:rPr>
               <a:t>this project, we develop a model derived from one such solution and generalize it to almost all powered aircraft by making conservative initial assumptions about their capabilities and then improving them by extrapolating from state action pairs. This modification allows us to provide a truly comprehensive collision avoidance system that can be used in most powered airplanes.</a:t>
             </a:r>
-            <a:endParaRPr lang="en-US" sz="3200" dirty="0">
-              <a:latin typeface="Calibri" pitchFamily="34" charset="0"/>
-            </a:endParaRPr>
           </a:p>
         </p:txBody>
       </p:sp>
@@ -3905,8 +3876,8 @@
           </a:p>
         </p:txBody>
       </p:sp>
-      <mc:AlternateContent xmlns:mc="http://schemas.openxmlformats.org/markup-compatibility/2006">
-        <mc:Choice xmlns:a14="http://schemas.microsoft.com/office/drawing/2010/main" Requires="a14">
+      <mc:AlternateContent xmlns:mc="http://schemas.openxmlformats.org/markup-compatibility/2006" xmlns:a14="http://schemas.microsoft.com/office/drawing/2010/main">
+        <mc:Choice Requires="a14">
           <p:sp>
             <p:nvSpPr>
               <p:cNvPr id="13" name="Text Box 192"/>
@@ -4043,13 +4014,7 @@
                   <a:rPr lang="en-US" sz="3200" dirty="0" smtClean="0">
                     <a:latin typeface="Calibri" pitchFamily="34" charset="0"/>
                   </a:rPr>
-                  <a:t>We model the problem as a POMDP, which </a:t>
-                </a:r>
-                <a:r>
-                  <a:rPr lang="en-US" sz="3200" dirty="0" smtClean="0">
-                    <a:latin typeface="Calibri" pitchFamily="34" charset="0"/>
-                  </a:rPr>
-                  <a:t>comprises </a:t>
+                  <a:t>We model the problem as a POMDP, which comprises </a:t>
                 </a:r>
                 <a:r>
                   <a:rPr lang="en-US" sz="3200" dirty="0">
@@ -4175,13 +4140,7 @@
                   <a:rPr lang="en-US" sz="3200" dirty="0" smtClean="0">
                     <a:latin typeface="Calibri" pitchFamily="34" charset="0"/>
                   </a:rPr>
-                  <a:t>Bellman equation</a:t>
-                </a:r>
-                <a:r>
-                  <a:rPr lang="en-US" sz="3200" dirty="0" smtClean="0">
-                    <a:latin typeface="Calibri" pitchFamily="34" charset="0"/>
-                  </a:rPr>
-                  <a:t>:</a:t>
+                  <a:t>Bellman equation:</a:t>
                 </a:r>
                 <a:endParaRPr lang="en-US" sz="3200" dirty="0">
                   <a:latin typeface="Calibri" pitchFamily="34" charset="0"/>
@@ -4299,9 +4258,6 @@
                   </a:rPr>
                   <a:t>capabilities.</a:t>
                 </a:r>
-                <a:endParaRPr lang="en-US" sz="3200" dirty="0" smtClean="0">
-                  <a:latin typeface="Calibri" pitchFamily="34" charset="0"/>
-                </a:endParaRPr>
               </a:p>
               <a:p>
                 <a:pPr eaLnBrk="1" hangingPunct="1"/>
@@ -4318,7 +4274,7 @@
             </p:txBody>
           </p:sp>
         </mc:Choice>
-        <mc:Fallback>
+        <mc:Fallback xmlns="">
           <p:sp>
             <p:nvSpPr>
               <p:cNvPr id="13" name="Text Box 192"/>
@@ -4565,13 +4521,7 @@
               <a:rPr lang="en-US" sz="3200" dirty="0" smtClean="0">
                 <a:latin typeface="Calibri" pitchFamily="34" charset="0"/>
               </a:rPr>
-              <a:t>Reward is </a:t>
-            </a:r>
-            <a:r>
-              <a:rPr lang="en-US" sz="3200" dirty="0" smtClean="0">
-                <a:latin typeface="Calibri" pitchFamily="34" charset="0"/>
-              </a:rPr>
-              <a:t>calculated </a:t>
+              <a:t>Reward is calculated </a:t>
             </a:r>
             <a:r>
               <a:rPr lang="en-US" sz="3200" dirty="0">
@@ -5125,7 +5075,7 @@
           <p:nvPr>
             <p:extLst>
               <p:ext uri="{D42A27DB-BD31-4B8C-83A1-F6EECF244321}">
-                <p14:modId xmlns:p14="http://schemas.microsoft.com/office/powerpoint/2010/main" val="1103164279"/>
+                <p14:modId xmlns:p14="http://schemas.microsoft.com/office/powerpoint/2010/main" val="1662684712"/>
               </p:ext>
             </p:extLst>
           </p:nvPr>
@@ -5251,7 +5201,6 @@
                         <a:rPr lang="en-US" sz="2700" dirty="0" smtClean="0"/>
                         <a:t>0.047315</a:t>
                       </a:r>
-                      <a:endParaRPr lang="en-US" sz="2700" dirty="0" smtClean="0"/>
                     </a:p>
                   </a:txBody>
                   <a:tcPr marL="121920" marR="121920" marT="34290" marB="34290" anchor="ctr"/>
@@ -5283,8 +5232,8 @@
                     <a:p>
                       <a:pPr algn="ctr"/>
                       <a:r>
-                        <a:rPr lang="en-US" sz="2700" dirty="0" smtClean="0"/>
-                        <a:t>0.002071</a:t>
+                        <a:rPr lang="en-US" sz="2700" smtClean="0"/>
+                        <a:t>0.02071</a:t>
                       </a:r>
                       <a:endParaRPr lang="en-US" sz="2700" dirty="0"/>
                     </a:p>
@@ -5401,7 +5350,7 @@
           </a:ln>
           <a:extLst>
             <a:ext uri="{909E8E84-426E-40dd-AFC4-6F175D3DCCD1}">
-              <a14:hiddenFill xmlns:a14="http://schemas.microsoft.com/office/drawing/2010/main" xmlns="">
+              <a14:hiddenFill xmlns="" xmlns:a14="http://schemas.microsoft.com/office/drawing/2010/main">
                 <a:solidFill>
                   <a:srgbClr val="FFFFFF"/>
                 </a:solidFill>
@@ -5444,14 +5393,14 @@
           </a:ln>
           <a:extLst>
             <a:ext uri="{909E8E84-426E-40dd-AFC4-6F175D3DCCD1}">
-              <a14:hiddenFill xmlns:a14="http://schemas.microsoft.com/office/drawing/2010/main" xmlns="">
+              <a14:hiddenFill xmlns="" xmlns:a14="http://schemas.microsoft.com/office/drawing/2010/main">
                 <a:solidFill>
                   <a:srgbClr val="FFFFFF"/>
                 </a:solidFill>
               </a14:hiddenFill>
             </a:ext>
             <a:ext uri="{91240B29-F687-4f45-9708-019B960494DF}">
-              <a14:hiddenLine xmlns:a14="http://schemas.microsoft.com/office/drawing/2010/main" xmlns="" w="9525">
+              <a14:hiddenLine xmlns="" xmlns:a14="http://schemas.microsoft.com/office/drawing/2010/main" w="9525">
                 <a:solidFill>
                   <a:srgbClr val="000000"/>
                 </a:solidFill>
@@ -5486,14 +5435,14 @@
           <a:effectLst/>
           <a:extLst>
             <a:ext uri="{909E8E84-426E-40dd-AFC4-6F175D3DCCD1}">
-              <a14:hiddenFill xmlns:a14="http://schemas.microsoft.com/office/drawing/2010/main" xmlns="">
+              <a14:hiddenFill xmlns="" xmlns:a14="http://schemas.microsoft.com/office/drawing/2010/main">
                 <a:solidFill>
                   <a:schemeClr val="accent1"/>
                 </a:solidFill>
               </a14:hiddenFill>
             </a:ext>
             <a:ext uri="{91240B29-F687-4f45-9708-019B960494DF}">
-              <a14:hiddenLine xmlns:a14="http://schemas.microsoft.com/office/drawing/2010/main" xmlns="" w="9525">
+              <a14:hiddenLine xmlns="" xmlns:a14="http://schemas.microsoft.com/office/drawing/2010/main" w="9525">
                 <a:solidFill>
                   <a:schemeClr val="tx1"/>
                 </a:solidFill>
@@ -5503,7 +5452,7 @@
               </a14:hiddenLine>
             </a:ext>
             <a:ext uri="{AF507438-7753-43e0-B8FC-AC1667EBCBE1}">
-              <a14:hiddenEffects xmlns:a14="http://schemas.microsoft.com/office/drawing/2010/main" xmlns="">
+              <a14:hiddenEffects xmlns="" xmlns:a14="http://schemas.microsoft.com/office/drawing/2010/main">
                 <a:effectLst>
                   <a:outerShdw dist="35921" dir="2700000" algn="ctr" rotWithShape="0">
                     <a:schemeClr val="bg2"/>
@@ -5667,14 +5616,14 @@
           <a:effectLst/>
           <a:extLst>
             <a:ext uri="{909E8E84-426E-40dd-AFC4-6F175D3DCCD1}">
-              <a14:hiddenFill xmlns:a14="http://schemas.microsoft.com/office/drawing/2010/main" xmlns="">
+              <a14:hiddenFill xmlns="" xmlns:a14="http://schemas.microsoft.com/office/drawing/2010/main">
                 <a:solidFill>
                   <a:schemeClr val="accent1"/>
                 </a:solidFill>
               </a14:hiddenFill>
             </a:ext>
             <a:ext uri="{91240B29-F687-4f45-9708-019B960494DF}">
-              <a14:hiddenLine xmlns:a14="http://schemas.microsoft.com/office/drawing/2010/main" xmlns="" w="9525">
+              <a14:hiddenLine xmlns="" xmlns:a14="http://schemas.microsoft.com/office/drawing/2010/main" w="9525">
                 <a:solidFill>
                   <a:schemeClr val="tx1"/>
                 </a:solidFill>
@@ -5684,7 +5633,7 @@
               </a14:hiddenLine>
             </a:ext>
             <a:ext uri="{AF507438-7753-43e0-B8FC-AC1667EBCBE1}">
-              <a14:hiddenEffects xmlns:a14="http://schemas.microsoft.com/office/drawing/2010/main" xmlns="">
+              <a14:hiddenEffects xmlns="" xmlns:a14="http://schemas.microsoft.com/office/drawing/2010/main">
                 <a:effectLst>
                   <a:outerShdw dist="35921" dir="2700000" algn="ctr" rotWithShape="0">
                     <a:schemeClr val="bg2"/>
@@ -5848,14 +5797,14 @@
           <a:effectLst/>
           <a:extLst>
             <a:ext uri="{909E8E84-426E-40dd-AFC4-6F175D3DCCD1}">
-              <a14:hiddenFill xmlns:a14="http://schemas.microsoft.com/office/drawing/2010/main" xmlns="">
+              <a14:hiddenFill xmlns="" xmlns:a14="http://schemas.microsoft.com/office/drawing/2010/main">
                 <a:solidFill>
                   <a:schemeClr val="accent1"/>
                 </a:solidFill>
               </a14:hiddenFill>
             </a:ext>
             <a:ext uri="{91240B29-F687-4f45-9708-019B960494DF}">
-              <a14:hiddenLine xmlns:a14="http://schemas.microsoft.com/office/drawing/2010/main" xmlns="" w="9525">
+              <a14:hiddenLine xmlns="" xmlns:a14="http://schemas.microsoft.com/office/drawing/2010/main" w="9525">
                 <a:solidFill>
                   <a:schemeClr val="tx1"/>
                 </a:solidFill>
@@ -5865,7 +5814,7 @@
               </a14:hiddenLine>
             </a:ext>
             <a:ext uri="{AF507438-7753-43e0-B8FC-AC1667EBCBE1}">
-              <a14:hiddenEffects xmlns:a14="http://schemas.microsoft.com/office/drawing/2010/main" xmlns="">
+              <a14:hiddenEffects xmlns="" xmlns:a14="http://schemas.microsoft.com/office/drawing/2010/main">
                 <a:effectLst>
                   <a:outerShdw dist="35921" dir="2700000" algn="ctr" rotWithShape="0">
                     <a:schemeClr val="bg2"/>
@@ -6048,14 +5997,14 @@
           <a:effectLst/>
           <a:extLst>
             <a:ext uri="{909E8E84-426E-40dd-AFC4-6F175D3DCCD1}">
-              <a14:hiddenFill xmlns:a14="http://schemas.microsoft.com/office/drawing/2010/main" xmlns="">
+              <a14:hiddenFill xmlns="" xmlns:a14="http://schemas.microsoft.com/office/drawing/2010/main">
                 <a:solidFill>
                   <a:schemeClr val="accent1"/>
                 </a:solidFill>
               </a14:hiddenFill>
             </a:ext>
             <a:ext uri="{91240B29-F687-4f45-9708-019B960494DF}">
-              <a14:hiddenLine xmlns:a14="http://schemas.microsoft.com/office/drawing/2010/main" xmlns="" w="9525">
+              <a14:hiddenLine xmlns="" xmlns:a14="http://schemas.microsoft.com/office/drawing/2010/main" w="9525">
                 <a:solidFill>
                   <a:schemeClr val="tx1"/>
                 </a:solidFill>
@@ -6065,7 +6014,7 @@
               </a14:hiddenLine>
             </a:ext>
             <a:ext uri="{AF507438-7753-43e0-B8FC-AC1667EBCBE1}">
-              <a14:hiddenEffects xmlns:a14="http://schemas.microsoft.com/office/drawing/2010/main" xmlns="">
+              <a14:hiddenEffects xmlns="" xmlns:a14="http://schemas.microsoft.com/office/drawing/2010/main">
                 <a:effectLst>
                   <a:outerShdw dist="35921" dir="2700000" algn="ctr" rotWithShape="0">
                     <a:schemeClr val="bg2"/>
@@ -6242,7 +6191,7 @@
           <a:effectLst/>
           <a:extLst>
             <a:ext uri="{AF507438-7753-43e0-B8FC-AC1667EBCBE1}">
-              <a14:hiddenEffects xmlns:a14="http://schemas.microsoft.com/office/drawing/2010/main" xmlns="">
+              <a14:hiddenEffects xmlns="" xmlns:a14="http://schemas.microsoft.com/office/drawing/2010/main">
                 <a:effectLst>
                   <a:outerShdw dist="35921" dir="2700000" algn="ctr" rotWithShape="0">
                     <a:schemeClr val="bg2"/>
@@ -6483,43 +6432,19 @@
               <a:rPr lang="en-US" sz="3200" dirty="0" smtClean="0">
                 <a:latin typeface="Calibri" pitchFamily="34" charset="0"/>
               </a:rPr>
-              <a:t>strategy generalized for </a:t>
+              <a:t>strategy generalized for airplanes of most classes. In particular</a:t>
+            </a:r>
+            <a:r>
+              <a:rPr lang="en-US" sz="3200" dirty="0">
+                <a:latin typeface="Calibri" pitchFamily="34" charset="0"/>
+              </a:rPr>
+              <a:t>, we </a:t>
             </a:r>
             <a:r>
               <a:rPr lang="en-US" sz="3200" dirty="0" smtClean="0">
                 <a:latin typeface="Calibri" pitchFamily="34" charset="0"/>
               </a:rPr>
-              <a:t>airplanes of most classes</a:t>
-            </a:r>
-            <a:r>
-              <a:rPr lang="en-US" sz="3200" dirty="0" smtClean="0">
-                <a:latin typeface="Calibri" pitchFamily="34" charset="0"/>
-              </a:rPr>
-              <a:t>. </a:t>
-            </a:r>
-            <a:r>
-              <a:rPr lang="en-US" sz="3200" dirty="0" smtClean="0">
-                <a:latin typeface="Calibri" pitchFamily="34" charset="0"/>
-              </a:rPr>
-              <a:t>In particular</a:t>
-            </a:r>
-            <a:r>
-              <a:rPr lang="en-US" sz="3200" dirty="0">
-                <a:latin typeface="Calibri" pitchFamily="34" charset="0"/>
-              </a:rPr>
-              <a:t>, we </a:t>
-            </a:r>
-            <a:r>
-              <a:rPr lang="en-US" sz="3200" dirty="0" smtClean="0">
-                <a:latin typeface="Calibri" pitchFamily="34" charset="0"/>
-              </a:rPr>
-              <a:t>extend an existing deep reinforcement learning methodology used for unmanned aerial systems by implementing an evolving action space. We </a:t>
-            </a:r>
-            <a:r>
-              <a:rPr lang="en-US" sz="3200" dirty="0" smtClean="0">
-                <a:latin typeface="Calibri" pitchFamily="34" charset="0"/>
-              </a:rPr>
-              <a:t>evaluate our strategy’s performance </a:t>
+              <a:t>extend an existing deep reinforcement learning methodology used for unmanned aerial systems by implementing an evolving action space. We evaluate our strategy’s performance </a:t>
             </a:r>
             <a:r>
               <a:rPr lang="en-US" sz="3200" dirty="0">
@@ -6588,7 +6513,7 @@
           <a:graphicData uri="http://schemas.openxmlformats.org/presentationml/2006/ole">
             <mc:AlternateContent xmlns:mc="http://schemas.openxmlformats.org/markup-compatibility/2006">
               <mc:Choice xmlns:v="urn:schemas-microsoft-com:vml" Requires="v">
-                <p:oleObj spid="_x0000_s1062" name="Equation" r:id="rId13" imgW="1320800" imgH="241300" progId="Equation.3">
+                <p:oleObj spid="_x0000_s1065" name="Equation" r:id="rId13" imgW="1320800" imgH="241300" progId="Equation.3">
                   <p:embed/>
                 </p:oleObj>
               </mc:Choice>
@@ -6645,7 +6570,7 @@
           <a:graphicData uri="http://schemas.openxmlformats.org/presentationml/2006/ole">
             <mc:AlternateContent xmlns:mc="http://schemas.openxmlformats.org/markup-compatibility/2006">
               <mc:Choice xmlns:v="urn:schemas-microsoft-com:vml" Requires="v">
-                <p:oleObj spid="_x0000_s1063" name="Equation" r:id="rId15" imgW="3035300" imgH="266700" progId="Equation.3">
+                <p:oleObj spid="_x0000_s1066" name="Equation" r:id="rId15" imgW="3035300" imgH="266700" progId="Equation.3">
                   <p:embed/>
                 </p:oleObj>
               </mc:Choice>

</xml_diff>